<commit_message>
return old plane pic
</commit_message>
<xml_diff>
--- a/report/report 李淳雨20170220.pptx
+++ b/report/report 李淳雨20170220.pptx
@@ -5367,7 +5367,27 @@
           <a:p>
             <a:r>
               <a:rPr kumimoji="1" lang="ja-JP" altLang="en-US" dirty="0" smtClean="0"/>
-              <a:t>結果</a:t>
+              <a:t>結</a:t>
+            </a:r>
+            <a:r>
+              <a:rPr kumimoji="1" lang="ja-JP" altLang="en-US" dirty="0" smtClean="0"/>
+              <a:t>果</a:t>
+            </a:r>
+            <a:r>
+              <a:rPr kumimoji="1" lang="zh-CN" altLang="en-US" dirty="0" smtClean="0"/>
+              <a:t>（</a:t>
+            </a:r>
+            <a:r>
+              <a:rPr kumimoji="1" lang="ja-JP" altLang="en-US" dirty="0" smtClean="0"/>
+              <a:t>画像解像度</a:t>
+            </a:r>
+            <a:r>
+              <a:rPr lang="en-US" altLang="ja-JP" dirty="0"/>
+              <a:t>1280*960 </a:t>
+            </a:r>
+            <a:r>
+              <a:rPr kumimoji="1" lang="zh-CN" altLang="en-US" dirty="0" smtClean="0"/>
+              <a:t>）</a:t>
             </a:r>
             <a:endParaRPr kumimoji="1" lang="ja-JP" altLang="en-US" dirty="0"/>
           </a:p>
@@ -5405,7 +5425,7 @@
           <p:nvPr>
             <p:extLst>
               <p:ext uri="{D42A27DB-BD31-4B8C-83A1-F6EECF244321}">
-                <p14:modId xmlns:p14="http://schemas.microsoft.com/office/powerpoint/2010/main" val="3416122867"/>
+                <p14:modId xmlns:p14="http://schemas.microsoft.com/office/powerpoint/2010/main" val="2058574666"/>
               </p:ext>
             </p:extLst>
           </p:nvPr>
@@ -5424,42 +5444,42 @@
                 <a:gridCol w="702261">
                   <a:extLst>
                     <a:ext uri="{9D8B030D-6E8A-4147-A177-3AD203B41FA5}">
-                      <a16:colId xmlns:a16="http://schemas.microsoft.com/office/drawing/2014/main" xmlns="" val="110332252"/>
+                      <a16:colId xmlns="" xmlns:a16="http://schemas.microsoft.com/office/drawing/2014/main" val="110332252"/>
                     </a:ext>
                   </a:extLst>
                 </a:gridCol>
                 <a:gridCol w="1623973">
                   <a:extLst>
                     <a:ext uri="{9D8B030D-6E8A-4147-A177-3AD203B41FA5}">
-                      <a16:colId xmlns:a16="http://schemas.microsoft.com/office/drawing/2014/main" xmlns="" val="1476679492"/>
+                      <a16:colId xmlns="" xmlns:a16="http://schemas.microsoft.com/office/drawing/2014/main" val="1476679492"/>
                     </a:ext>
                   </a:extLst>
                 </a:gridCol>
                 <a:gridCol w="1408147">
                   <a:extLst>
                     <a:ext uri="{9D8B030D-6E8A-4147-A177-3AD203B41FA5}">
-                      <a16:colId xmlns:a16="http://schemas.microsoft.com/office/drawing/2014/main" xmlns="" val="636332937"/>
+                      <a16:colId xmlns="" xmlns:a16="http://schemas.microsoft.com/office/drawing/2014/main" val="636332937"/>
                     </a:ext>
                   </a:extLst>
                 </a:gridCol>
                 <a:gridCol w="1513984">
                   <a:extLst>
                     <a:ext uri="{9D8B030D-6E8A-4147-A177-3AD203B41FA5}">
-                      <a16:colId xmlns:a16="http://schemas.microsoft.com/office/drawing/2014/main" xmlns="" val="2242567350"/>
+                      <a16:colId xmlns="" xmlns:a16="http://schemas.microsoft.com/office/drawing/2014/main" val="2242567350"/>
                     </a:ext>
                   </a:extLst>
                 </a:gridCol>
                 <a:gridCol w="1119256">
                   <a:extLst>
                     <a:ext uri="{9D8B030D-6E8A-4147-A177-3AD203B41FA5}">
-                      <a16:colId xmlns:a16="http://schemas.microsoft.com/office/drawing/2014/main" xmlns="" val="417842951"/>
+                      <a16:colId xmlns="" xmlns:a16="http://schemas.microsoft.com/office/drawing/2014/main" val="417842951"/>
                     </a:ext>
                   </a:extLst>
                 </a:gridCol>
                 <a:gridCol w="1119256">
                   <a:extLst>
                     <a:ext uri="{9D8B030D-6E8A-4147-A177-3AD203B41FA5}">
-                      <a16:colId xmlns:a16="http://schemas.microsoft.com/office/drawing/2014/main" xmlns="" val="2570845072"/>
+                      <a16:colId xmlns="" xmlns:a16="http://schemas.microsoft.com/office/drawing/2014/main" val="2570845072"/>
                     </a:ext>
                   </a:extLst>
                 </a:gridCol>
@@ -5472,8 +5492,8 @@
                     <a:p>
                       <a:pPr algn="ctr"/>
                       <a:r>
-                        <a:rPr kumimoji="1" lang="en-US" altLang="ja-JP" dirty="0" smtClean="0"/>
-                        <a:t>Plane</a:t>
+                        <a:rPr kumimoji="1" lang="ja-JP" altLang="en-US" dirty="0" smtClean="0"/>
+                        <a:t>平面</a:t>
                       </a:r>
                       <a:endParaRPr kumimoji="1" lang="ja-JP" altLang="en-US" dirty="0"/>
                     </a:p>
@@ -5487,8 +5507,8 @@
                     <a:p>
                       <a:pPr algn="ctr"/>
                       <a:r>
-                        <a:rPr kumimoji="1" lang="en-US" altLang="ja-JP" dirty="0" err="1" smtClean="0"/>
-                        <a:t>Funtion</a:t>
+                        <a:rPr kumimoji="1" lang="ja-JP" altLang="en-US" dirty="0" smtClean="0"/>
+                        <a:t>手法</a:t>
                       </a:r>
                       <a:endParaRPr kumimoji="1" lang="ja-JP" altLang="en-US" dirty="0"/>
                     </a:p>
@@ -5503,7 +5523,11 @@
                       <a:pPr algn="ctr"/>
                       <a:r>
                         <a:rPr kumimoji="1" lang="en-US" altLang="ja-JP" dirty="0" smtClean="0"/>
-                        <a:t>3d points</a:t>
+                        <a:t>3d</a:t>
+                      </a:r>
+                      <a:r>
+                        <a:rPr kumimoji="1" lang="ja-JP" altLang="en-US" dirty="0" smtClean="0"/>
+                        <a:t>点群</a:t>
                       </a:r>
                       <a:endParaRPr kumimoji="1" lang="ja-JP" altLang="en-US" dirty="0"/>
                     </a:p>
@@ -5525,12 +5549,26 @@
                     <a:bodyPr/>
                     <a:lstStyle/>
                     <a:p>
-                      <a:pPr algn="ctr"/>
+                      <a:pPr marL="0" algn="ctr" defTabSz="914400" rtl="0" eaLnBrk="1" latinLnBrk="0" hangingPunct="1"/>
                       <a:r>
-                        <a:rPr kumimoji="1" lang="en-US" altLang="ja-JP" dirty="0" smtClean="0"/>
+                        <a:rPr kumimoji="1" lang="en-US" altLang="ja-JP" sz="1800" kern="1200" dirty="0" smtClean="0">
+                          <a:solidFill>
+                            <a:schemeClr val="tx1"/>
+                          </a:solidFill>
+                          <a:latin typeface="+mn-lt"/>
+                          <a:ea typeface="+mn-ea"/>
+                          <a:cs typeface="+mn-cs"/>
+                        </a:rPr>
                         <a:t>RMSE</a:t>
                       </a:r>
-                      <a:endParaRPr kumimoji="1" lang="ja-JP" altLang="en-US" dirty="0"/>
+                      <a:endParaRPr kumimoji="1" lang="ja-JP" altLang="en-US" sz="1800" kern="1200" dirty="0">
+                        <a:solidFill>
+                          <a:schemeClr val="tx1"/>
+                        </a:solidFill>
+                        <a:latin typeface="+mn-lt"/>
+                        <a:ea typeface="+mn-ea"/>
+                        <a:cs typeface="+mn-cs"/>
+                      </a:endParaRPr>
                     </a:p>
                   </a:txBody>
                   <a:tcPr anchor="ctr"/>
@@ -5542,8 +5580,16 @@
                     <a:p>
                       <a:pPr algn="ctr"/>
                       <a:r>
+                        <a:rPr kumimoji="1" lang="ja-JP" altLang="en-US" dirty="0" smtClean="0"/>
+                        <a:t>点数</a:t>
+                      </a:r>
+                      <a:r>
                         <a:rPr kumimoji="1" lang="en-US" altLang="ja-JP" dirty="0" smtClean="0"/>
-                        <a:t>Points(N)</a:t>
+                        <a:t>(N</a:t>
+                      </a:r>
+                      <a:r>
+                        <a:rPr kumimoji="1" lang="en-US" altLang="ja-JP" dirty="0" smtClean="0"/>
+                        <a:t>)</a:t>
                       </a:r>
                       <a:endParaRPr kumimoji="1" lang="ja-JP" altLang="en-US" dirty="0"/>
                     </a:p>
@@ -5552,7 +5598,7 @@
                 </a:tc>
                 <a:extLst>
                   <a:ext uri="{0D108BD9-81ED-4DB2-BD59-A6C34878D82A}">
-                    <a16:rowId xmlns:a16="http://schemas.microsoft.com/office/drawing/2014/main" xmlns="" val="100451580"/>
+                    <a16:rowId xmlns="" xmlns:a16="http://schemas.microsoft.com/office/drawing/2014/main" val="100451580"/>
                   </a:ext>
                 </a:extLst>
               </a:tr>
@@ -5585,7 +5631,11 @@
                       <a:pPr algn="ctr"/>
                       <a:r>
                         <a:rPr kumimoji="1" lang="en-US" altLang="ja-JP" dirty="0" smtClean="0"/>
-                        <a:t> Front view</a:t>
+                        <a:t> </a:t>
+                      </a:r>
+                      <a:r>
+                        <a:rPr kumimoji="1" lang="ja-JP" altLang="en-US" dirty="0" smtClean="0"/>
+                        <a:t>正面図</a:t>
                       </a:r>
                       <a:endParaRPr kumimoji="1" lang="ja-JP" altLang="en-US" dirty="0"/>
                     </a:p>
@@ -5597,12 +5647,26 @@
                     <a:bodyPr/>
                     <a:lstStyle/>
                     <a:p>
-                      <a:pPr algn="ctr"/>
+                      <a:pPr marL="0" algn="ctr" defTabSz="914400" rtl="0" eaLnBrk="1" latinLnBrk="0" hangingPunct="1"/>
                       <a:r>
-                        <a:rPr kumimoji="1" lang="en-US" altLang="ja-JP" dirty="0" smtClean="0"/>
-                        <a:t>Vertical view</a:t>
+                        <a:rPr kumimoji="1" lang="zh-CN" altLang="en-US" sz="1800" kern="1200" dirty="0" smtClean="0">
+                          <a:solidFill>
+                            <a:schemeClr val="tx1"/>
+                          </a:solidFill>
+                          <a:latin typeface="+mn-lt"/>
+                          <a:ea typeface="+mn-ea"/>
+                          <a:cs typeface="+mn-cs"/>
+                        </a:rPr>
+                        <a:t>上面図</a:t>
                       </a:r>
-                      <a:endParaRPr kumimoji="1" lang="ja-JP" altLang="en-US" dirty="0"/>
+                      <a:endParaRPr kumimoji="1" lang="ja-JP" altLang="en-US" sz="1800" kern="1200" dirty="0">
+                        <a:solidFill>
+                          <a:schemeClr val="tx1"/>
+                        </a:solidFill>
+                        <a:latin typeface="+mn-lt"/>
+                        <a:ea typeface="+mn-ea"/>
+                        <a:cs typeface="+mn-cs"/>
+                      </a:endParaRPr>
                     </a:p>
                   </a:txBody>
                   <a:tcPr anchor="ctr"/>
@@ -5629,7 +5693,7 @@
                 </a:tc>
                 <a:extLst>
                   <a:ext uri="{0D108BD9-81ED-4DB2-BD59-A6C34878D82A}">
-                    <a16:rowId xmlns:a16="http://schemas.microsoft.com/office/drawing/2014/main" xmlns="" val="2807080070"/>
+                    <a16:rowId xmlns="" xmlns:a16="http://schemas.microsoft.com/office/drawing/2014/main" val="2807080070"/>
                   </a:ext>
                 </a:extLst>
               </a:tr>
@@ -5717,7 +5781,7 @@
                 </a:tc>
                 <a:extLst>
                   <a:ext uri="{0D108BD9-81ED-4DB2-BD59-A6C34878D82A}">
-                    <a16:rowId xmlns:a16="http://schemas.microsoft.com/office/drawing/2014/main" xmlns="" val="746087664"/>
+                    <a16:rowId xmlns="" xmlns:a16="http://schemas.microsoft.com/office/drawing/2014/main" val="746087664"/>
                   </a:ext>
                 </a:extLst>
               </a:tr>
@@ -5846,7 +5910,7 @@
                 </a:tc>
                 <a:extLst>
                   <a:ext uri="{0D108BD9-81ED-4DB2-BD59-A6C34878D82A}">
-                    <a16:rowId xmlns:a16="http://schemas.microsoft.com/office/drawing/2014/main" xmlns="" val="2046089664"/>
+                    <a16:rowId xmlns="" xmlns:a16="http://schemas.microsoft.com/office/drawing/2014/main" val="2046089664"/>
                   </a:ext>
                 </a:extLst>
               </a:tr>
@@ -5934,7 +5998,7 @@
                 </a:tc>
                 <a:extLst>
                   <a:ext uri="{0D108BD9-81ED-4DB2-BD59-A6C34878D82A}">
-                    <a16:rowId xmlns:a16="http://schemas.microsoft.com/office/drawing/2014/main" xmlns="" val="219203116"/>
+                    <a16:rowId xmlns="" xmlns:a16="http://schemas.microsoft.com/office/drawing/2014/main" val="219203116"/>
                   </a:ext>
                 </a:extLst>
               </a:tr>
@@ -6030,7 +6094,7 @@
                 </a:tc>
                 <a:extLst>
                   <a:ext uri="{0D108BD9-81ED-4DB2-BD59-A6C34878D82A}">
-                    <a16:rowId xmlns:a16="http://schemas.microsoft.com/office/drawing/2014/main" xmlns="" val="3745567008"/>
+                    <a16:rowId xmlns="" xmlns:a16="http://schemas.microsoft.com/office/drawing/2014/main" val="3745567008"/>
                   </a:ext>
                 </a:extLst>
               </a:tr>
@@ -6569,7 +6633,7 @@
             </a:r>
             <a:r>
               <a:rPr lang="en-US" altLang="ja-JP" sz="1800" dirty="0" smtClean="0"/>
-              <a:t>&lt; 1/</a:t>
+              <a:t>&gt; </a:t>
             </a:r>
             <a:r>
               <a:rPr lang="en-US" altLang="zh-CN" sz="1800" dirty="0" smtClean="0"/>
@@ -6660,7 +6724,11 @@
             </a:pPr>
             <a:r>
               <a:rPr lang="ja-JP" altLang="en-US" sz="1800" dirty="0" smtClean="0"/>
-              <a:t>露出時間が長くなったので、画像の明るさが高くなりました</a:t>
+              <a:t>露出時間が長</a:t>
+            </a:r>
+            <a:r>
+              <a:rPr lang="ja-JP" altLang="en-US" sz="1800" dirty="0" smtClean="0"/>
+              <a:t>くなったので、画像の明るさが高くなりました</a:t>
             </a:r>
             <a:endParaRPr lang="en-US" altLang="ja-JP" sz="1800" dirty="0" smtClean="0"/>
           </a:p>
@@ -7212,7 +7280,7 @@
         </p:nvSpPr>
         <p:spPr>
           <a:xfrm>
-            <a:off x="7670698" y="3405047"/>
+            <a:off x="7735093" y="3405047"/>
             <a:ext cx="1018854" cy="514350"/>
           </a:xfrm>
           <a:prstGeom prst="parallelogram">
@@ -7250,11 +7318,7 @@
             <a:pPr algn="ctr"/>
             <a:r>
               <a:rPr kumimoji="1" lang="en-US" altLang="ja-JP" dirty="0" smtClean="0"/>
-              <a:t>Point </a:t>
-            </a:r>
-            <a:r>
-              <a:rPr kumimoji="1" lang="en-US" altLang="ja-JP" dirty="0" smtClean="0"/>
-              <a:t>cloud</a:t>
+              <a:t>Point cloud</a:t>
             </a:r>
             <a:endParaRPr kumimoji="1" lang="ja-JP" altLang="en-US" dirty="0"/>
           </a:p>
@@ -7423,7 +7487,7 @@
         </p:nvSpPr>
         <p:spPr>
           <a:xfrm>
-            <a:off x="6243055" y="3405047"/>
+            <a:off x="6307450" y="3405047"/>
             <a:ext cx="1216013" cy="514350"/>
           </a:xfrm>
           <a:prstGeom prst="rect">
@@ -7570,8 +7634,8 @@
         </p:nvSpPr>
         <p:spPr>
           <a:xfrm>
-            <a:off x="5848656" y="2878561"/>
-            <a:ext cx="347981" cy="1592161"/>
+            <a:off x="6055776" y="2878561"/>
+            <a:ext cx="205256" cy="1592161"/>
           </a:xfrm>
           <a:prstGeom prst="rightBrace">
             <a:avLst/>
@@ -7668,7 +7732,7 @@
         </p:nvCxnSpPr>
         <p:spPr>
           <a:xfrm>
-            <a:off x="7459068" y="3662222"/>
+            <a:off x="7523463" y="3662222"/>
             <a:ext cx="275924" cy="0"/>
           </a:xfrm>
           <a:prstGeom prst="straightConnector1">
@@ -7705,7 +7769,7 @@
         <p:spPr>
           <a:xfrm>
             <a:off x="4382608" y="2873313"/>
-            <a:ext cx="1261193" cy="514350"/>
+            <a:ext cx="1672468" cy="514350"/>
           </a:xfrm>
           <a:prstGeom prst="parallelogram">
             <a:avLst/>
@@ -7748,9 +7812,18 @@
               <a:t> </a:t>
             </a:r>
             <a:r>
-              <a:rPr lang="en-US" altLang="ja-JP" dirty="0"/>
+              <a:rPr lang="en-US" altLang="ja-JP" dirty="0" smtClean="0"/>
               <a:t>Points</a:t>
             </a:r>
+            <a:r>
+              <a:rPr lang="zh-CN" altLang="en-US" dirty="0"/>
+              <a:t> </a:t>
+            </a:r>
+            <a:r>
+              <a:rPr lang="en-US" altLang="zh-CN" dirty="0" smtClean="0"/>
+              <a:t>pairs</a:t>
+            </a:r>
+            <a:endParaRPr lang="en-US" altLang="ja-JP" dirty="0"/>
           </a:p>
         </p:txBody>
       </p:sp>
@@ -8568,6 +8641,22 @@
             <a:r>
               <a:rPr lang="ja-JP" altLang="en-US" dirty="0" smtClean="0"/>
               <a:t>果</a:t>
+            </a:r>
+            <a:r>
+              <a:rPr lang="zh-CN" altLang="en-US" dirty="0" smtClean="0"/>
+              <a:t>（</a:t>
+            </a:r>
+            <a:r>
+              <a:rPr lang="en-US" altLang="zh-CN" dirty="0" err="1"/>
+              <a:t>V</a:t>
+            </a:r>
+            <a:r>
+              <a:rPr lang="en-US" altLang="zh-CN" dirty="0" err="1" smtClean="0"/>
+              <a:t>isualSFM</a:t>
+            </a:r>
+            <a:r>
+              <a:rPr lang="zh-CN" altLang="en-US" dirty="0" smtClean="0"/>
+              <a:t>）</a:t>
             </a:r>
             <a:endParaRPr lang="en-US" altLang="ja-JP" dirty="0" smtClean="0"/>
           </a:p>

</xml_diff>